<commit_message>
Added slide for ko:if
</commit_message>
<xml_diff>
--- a/KnockoutJS.pptx
+++ b/KnockoutJS.pptx
@@ -7,8 +7,9 @@
   <p:sldIdLst>
     <p:sldId id="256" r:id="rId2"/>
     <p:sldId id="257" r:id="rId3"/>
-    <p:sldId id="258" r:id="rId4"/>
-    <p:sldId id="259" r:id="rId5"/>
+    <p:sldId id="259" r:id="rId4"/>
+    <p:sldId id="260" r:id="rId5"/>
+    <p:sldId id="258" r:id="rId6"/>
   </p:sldIdLst>
   <p:sldSz cx="9144000" cy="5143500" type="screen16x9"/>
   <p:notesSz cx="6858000" cy="9144000"/>
@@ -476,7 +477,7 @@
           <a:p>
             <a:fld id="{A9710CDB-38B1-8E43-A846-6FE3B07A872E}" type="datetime1">
               <a:rPr lang="en-US" noProof="0" smtClean="0"/>
-              <a:t>4/10/2018</a:t>
+              <a:t>4/12/2018</a:t>
             </a:fld>
             <a:endParaRPr lang="nl-NL" noProof="0" dirty="0"/>
           </a:p>
@@ -871,7 +872,7 @@
           <a:p>
             <a:fld id="{12D8B67E-1464-254D-876A-5A059C6CA686}" type="datetime1">
               <a:rPr lang="en-US" smtClean="0"/>
-              <a:t>4/10/2018</a:t>
+              <a:t>4/12/2018</a:t>
             </a:fld>
             <a:endParaRPr lang="nl-NL"/>
           </a:p>
@@ -1290,7 +1291,7 @@
           <a:p>
             <a:fld id="{1297756A-AF1A-B249-A7CF-A1AE4E86FA38}" type="datetime1">
               <a:rPr lang="en-US" smtClean="0"/>
-              <a:t>4/10/2018</a:t>
+              <a:t>4/12/2018</a:t>
             </a:fld>
             <a:endParaRPr lang="nl-NL"/>
           </a:p>
@@ -1651,7 +1652,7 @@
           <a:p>
             <a:fld id="{37C8E900-D3BD-ED44-9070-3471A5611DC2}" type="datetime1">
               <a:rPr lang="en-US" smtClean="0"/>
-              <a:t>4/10/2018</a:t>
+              <a:t>4/12/2018</a:t>
             </a:fld>
             <a:endParaRPr lang="nl-NL"/>
           </a:p>
@@ -1829,7 +1830,7 @@
           <a:p>
             <a:fld id="{203D5A3F-EB4E-3340-8D19-07B028CB11AD}" type="datetime1">
               <a:rPr lang="en-US" smtClean="0"/>
-              <a:t>4/10/2018</a:t>
+              <a:t>4/12/2018</a:t>
             </a:fld>
             <a:endParaRPr lang="nl-NL"/>
           </a:p>
@@ -2758,7 +2759,7 @@
           <a:p>
             <a:fld id="{405216DA-0E4B-CC41-ACBF-76C3BC02E189}" type="datetime1">
               <a:rPr lang="en-US" smtClean="0"/>
-              <a:t>4/10/2018</a:t>
+              <a:t>4/12/2018</a:t>
             </a:fld>
             <a:endParaRPr lang="nl-NL"/>
           </a:p>
@@ -3007,7 +3008,7 @@
             <a:fld id="{6B386563-B90A-4125-A564-304866187BB1}" type="datetime1">
               <a:rPr lang="nl-NL" smtClean="0"/>
               <a:pPr/>
-              <a:t>10-4-2018</a:t>
+              <a:t>12-4-2018</a:t>
             </a:fld>
             <a:endParaRPr lang="nl-NL" dirty="0"/>
           </a:p>
@@ -3272,7 +3273,7 @@
           <a:p>
             <a:fld id="{A4AB6030-B80C-7C4C-B97F-1ADFAB53E146}" type="datetime1">
               <a:rPr lang="en-US" smtClean="0"/>
-              <a:t>4/10/2018</a:t>
+              <a:t>4/12/2018</a:t>
             </a:fld>
             <a:endParaRPr lang="nl-NL"/>
           </a:p>
@@ -3439,7 +3440,7 @@
           <a:p>
             <a:fld id="{DA73B474-0AB7-8846-BA6A-67033A8CF4FA}" type="datetime1">
               <a:rPr lang="en-US" smtClean="0"/>
-              <a:t>4/10/2018</a:t>
+              <a:t>4/12/2018</a:t>
             </a:fld>
             <a:endParaRPr lang="nl-NL"/>
           </a:p>
@@ -3901,7 +3902,7 @@
           <a:p>
             <a:fld id="{56BA50C8-7311-E14C-816D-7251E320C8DC}" type="datetime1">
               <a:rPr lang="en-US" smtClean="0"/>
-              <a:t>4/10/2018</a:t>
+              <a:t>4/12/2018</a:t>
             </a:fld>
             <a:endParaRPr lang="nl-NL"/>
           </a:p>
@@ -4514,7 +4515,7 @@
           <a:p>
             <a:fld id="{A9710CDB-38B1-8E43-A846-6FE3B07A872E}" type="datetime1">
               <a:rPr lang="en-US" noProof="0" smtClean="0"/>
-              <a:t>4/10/2018</a:t>
+              <a:t>4/12/2018</a:t>
             </a:fld>
             <a:endParaRPr lang="nl-NL" noProof="0" dirty="0"/>
           </a:p>
@@ -4828,7 +4829,7 @@
           <a:p>
             <a:fld id="{E300D605-E2BB-8B4E-A2F3-5A64231C34A6}" type="datetime1">
               <a:rPr lang="en-US" smtClean="0"/>
-              <a:t>4/10/2018</a:t>
+              <a:t>4/12/2018</a:t>
             </a:fld>
             <a:endParaRPr lang="nl-NL"/>
           </a:p>
@@ -5506,7 +5507,7 @@
           <a:p>
             <a:r>
               <a:rPr lang="nl-NL" smtClean="0"/>
-              <a:t>New syntax since JET 4.0</a:t>
+              <a:t>Observable Arrays</a:t>
             </a:r>
             <a:endParaRPr lang="nl-NL"/>
           </a:p>
@@ -5529,19 +5530,56 @@
           <a:p>
             <a:r>
               <a:rPr lang="nl-NL" smtClean="0"/>
-              <a:t>Oracle takes a small step towards Angular</a:t>
-            </a:r>
-          </a:p>
-          <a:p>
-            <a:endParaRPr lang="nl-NL" smtClean="0"/>
+              <a:t>Declare the array:</a:t>
+            </a:r>
           </a:p>
           <a:p>
             <a:pPr marL="0" indent="0">
               <a:buNone/>
             </a:pPr>
             <a:r>
+              <a:rPr lang="nl-NL" smtClean="0"/>
+              <a:t>	var niceArray = new ObservableArray([“String1”, “String2”]);</a:t>
+            </a:r>
+          </a:p>
+          <a:p>
+            <a:r>
+              <a:rPr lang="nl-NL" smtClean="0"/>
+              <a:t>Add a new item:</a:t>
+            </a:r>
+          </a:p>
+          <a:p>
+            <a:pPr marL="0" indent="0">
+              <a:buNone/>
+            </a:pPr>
+            <a:r>
+              <a:rPr lang="nl-NL" smtClean="0"/>
+              <a:t>	niceArray.push(“String3”);</a:t>
+            </a:r>
+          </a:p>
+          <a:p>
+            <a:r>
+              <a:rPr lang="nl-NL" smtClean="0"/>
+              <a:t>Remove last item:</a:t>
+            </a:r>
+          </a:p>
+          <a:p>
+            <a:pPr marL="360000" lvl="2" indent="0">
+              <a:buNone/>
+            </a:pPr>
+            <a:r>
               <a:rPr lang="nl-NL"/>
-              <a:t>&lt;span data-bind="text: id"&gt;&lt;/span&gt;</a:t>
+              <a:t>	</a:t>
+            </a:r>
+            <a:r>
+              <a:rPr lang="nl-NL" smtClean="0"/>
+              <a:t>niceArray.pop();</a:t>
+            </a:r>
+          </a:p>
+          <a:p>
+            <a:r>
+              <a:rPr lang="nl-NL" smtClean="0"/>
+              <a:t>Remove specific item:</a:t>
             </a:r>
           </a:p>
           <a:p>
@@ -5550,15 +5588,11 @@
             </a:pPr>
             <a:r>
               <a:rPr lang="nl-NL"/>
-              <a:t>&lt;span data-bind="text: name"&gt;&lt;/</a:t>
-            </a:r>
-            <a:r>
-              <a:rPr lang="nl-NL"/>
-              <a:t>span</a:t>
+              <a:t>	</a:t>
             </a:r>
             <a:r>
               <a:rPr lang="nl-NL" smtClean="0"/>
-              <a:t>&gt;</a:t>
+              <a:t>niceArray.remove(“String2”);</a:t>
             </a:r>
           </a:p>
           <a:p>
@@ -5572,67 +5606,8 @@
               <a:buNone/>
             </a:pPr>
             <a:r>
-              <a:rPr lang="nl-NL" smtClean="0"/>
-              <a:t>Becomes: </a:t>
-            </a:r>
-          </a:p>
-          <a:p>
-            <a:pPr marL="0" indent="0">
-              <a:buNone/>
-            </a:pPr>
-            <a:r>
-              <a:rPr lang="nl-NL" smtClean="0"/>
-              <a:t>&lt;</a:t>
-            </a:r>
-            <a:r>
               <a:rPr lang="nl-NL"/>
-              <a:t>p&gt;{{id}} {{name}}&lt;/</a:t>
-            </a:r>
-            <a:r>
-              <a:rPr lang="nl-NL"/>
-              <a:t>p</a:t>
-            </a:r>
-            <a:r>
-              <a:rPr lang="nl-NL" smtClean="0"/>
-              <a:t>&gt;</a:t>
-            </a:r>
-          </a:p>
-          <a:p>
-            <a:pPr marL="0" indent="0">
-              <a:buNone/>
-            </a:pPr>
-            <a:endParaRPr lang="nl-NL"/>
-          </a:p>
-          <a:p>
-            <a:r>
-              <a:rPr lang="nl-NL" smtClean="0"/>
-              <a:t>This is two-way databinding (write changes back to observable)</a:t>
-            </a:r>
-          </a:p>
-          <a:p>
-            <a:r>
-              <a:rPr lang="nl-NL" smtClean="0"/>
-              <a:t>One-way binding (no write-back) goes like this:</a:t>
-            </a:r>
-          </a:p>
-          <a:p>
-            <a:endParaRPr lang="nl-NL" smtClean="0"/>
-          </a:p>
-          <a:p>
-            <a:pPr marL="0" indent="0">
-              <a:buNone/>
-            </a:pPr>
-            <a:r>
-              <a:rPr lang="nl-NL"/>
-              <a:t>&lt;</a:t>
-            </a:r>
-            <a:r>
-              <a:rPr lang="nl-NL" smtClean="0"/>
-              <a:t>p&gt;[[id]] [[name]]&lt;/</a:t>
-            </a:r>
-            <a:r>
-              <a:rPr lang="nl-NL"/>
-              <a:t>p&gt;</a:t>
+              <a:t>Read more in documentation: http://knockoutjs.com/documentation/observableArrays.html</a:t>
             </a:r>
           </a:p>
           <a:p>
@@ -5704,7 +5679,7 @@
     </p:spTree>
     <p:extLst>
       <p:ext uri="{BB962C8B-B14F-4D97-AF65-F5344CB8AC3E}">
-        <p14:creationId xmlns:p14="http://schemas.microsoft.com/office/powerpoint/2010/main" val="2261056789"/>
+        <p14:creationId xmlns:p14="http://schemas.microsoft.com/office/powerpoint/2010/main" val="182169773"/>
       </p:ext>
     </p:extLst>
   </p:cSld>
@@ -5748,7 +5723,7 @@
           <a:p>
             <a:r>
               <a:rPr lang="nl-NL" smtClean="0"/>
-              <a:t>Observable Arrays</a:t>
+              <a:t>Ko if and if not</a:t>
             </a:r>
             <a:endParaRPr lang="nl-NL"/>
           </a:p>
@@ -5771,85 +5746,18 @@
           <a:p>
             <a:r>
               <a:rPr lang="nl-NL" smtClean="0"/>
-              <a:t>Declare the array:</a:t>
-            </a:r>
-          </a:p>
-          <a:p>
-            <a:pPr marL="0" indent="0">
-              <a:buNone/>
-            </a:pPr>
+              <a:t>Easy way to dynamically show and hide divs in your view</a:t>
+            </a:r>
+          </a:p>
+          <a:p>
             <a:r>
               <a:rPr lang="nl-NL" smtClean="0"/>
-              <a:t>	var niceArray = new ObservableArray([“String1”, “String2”]);</a:t>
-            </a:r>
-          </a:p>
-          <a:p>
-            <a:r>
-              <a:rPr lang="nl-NL" smtClean="0"/>
-              <a:t>Add a new item:</a:t>
-            </a:r>
-          </a:p>
-          <a:p>
-            <a:pPr marL="0" indent="0">
-              <a:buNone/>
-            </a:pPr>
-            <a:r>
-              <a:rPr lang="nl-NL" smtClean="0"/>
-              <a:t>	niceArray.push(“String3”);</a:t>
-            </a:r>
-          </a:p>
-          <a:p>
-            <a:r>
-              <a:rPr lang="nl-NL" smtClean="0"/>
-              <a:t>Remove last item:</a:t>
-            </a:r>
-          </a:p>
-          <a:p>
-            <a:pPr marL="360000" lvl="2" indent="0">
-              <a:buNone/>
-            </a:pPr>
-            <a:r>
-              <a:rPr lang="nl-NL"/>
-              <a:t>	</a:t>
-            </a:r>
-            <a:r>
-              <a:rPr lang="nl-NL" smtClean="0"/>
-              <a:t>niceArray.pop();</a:t>
-            </a:r>
-          </a:p>
-          <a:p>
-            <a:r>
-              <a:rPr lang="nl-NL" smtClean="0"/>
-              <a:t>Remove specific item:</a:t>
-            </a:r>
-          </a:p>
-          <a:p>
-            <a:pPr marL="0" indent="0">
-              <a:buNone/>
-            </a:pPr>
-            <a:r>
-              <a:rPr lang="nl-NL"/>
-              <a:t>	</a:t>
-            </a:r>
-            <a:r>
-              <a:rPr lang="nl-NL" smtClean="0"/>
-              <a:t>niceArray.remove(“String2”);</a:t>
-            </a:r>
-          </a:p>
-          <a:p>
-            <a:pPr marL="0" indent="0">
-              <a:buNone/>
-            </a:pPr>
+              <a:t>Use comment syntax:</a:t>
+            </a:r>
+          </a:p>
+          <a:p>
+            <a:pPr lvl="1"/>
             <a:endParaRPr lang="nl-NL"/>
-          </a:p>
-          <a:p>
-            <a:pPr marL="0" indent="0">
-              <a:buNone/>
-            </a:pPr>
-            <a:r>
-              <a:rPr lang="nl-NL"/>
-              <a:t>Read more in documentation: http://knockoutjs.com/documentation/observableArrays.html</a:t>
-            </a:r>
           </a:p>
           <a:p>
             <a:endParaRPr lang="nl-NL" smtClean="0"/>
@@ -5917,10 +5825,300 @@
           </a:p>
         </p:txBody>
       </p:sp>
+      <p:pic>
+        <p:nvPicPr>
+          <p:cNvPr id="7" name="Picture 6"/>
+          <p:cNvPicPr>
+            <a:picLocks noChangeAspect="1"/>
+          </p:cNvPicPr>
+          <p:nvPr/>
+        </p:nvPicPr>
+        <p:blipFill>
+          <a:blip r:embed="rId2"/>
+          <a:stretch>
+            <a:fillRect/>
+          </a:stretch>
+        </p:blipFill>
+        <p:spPr>
+          <a:xfrm>
+            <a:off x="979276" y="1609120"/>
+            <a:ext cx="5043369" cy="1175915"/>
+          </a:xfrm>
+          <a:prstGeom prst="rect">
+            <a:avLst/>
+          </a:prstGeom>
+        </p:spPr>
+      </p:pic>
+      <p:pic>
+        <p:nvPicPr>
+          <p:cNvPr id="8" name="Picture 7"/>
+          <p:cNvPicPr>
+            <a:picLocks noChangeAspect="1"/>
+          </p:cNvPicPr>
+          <p:nvPr/>
+        </p:nvPicPr>
+        <p:blipFill>
+          <a:blip r:embed="rId3"/>
+          <a:stretch>
+            <a:fillRect/>
+          </a:stretch>
+        </p:blipFill>
+        <p:spPr>
+          <a:xfrm>
+            <a:off x="979276" y="3073035"/>
+            <a:ext cx="4686706" cy="1112616"/>
+          </a:xfrm>
+          <a:prstGeom prst="rect">
+            <a:avLst/>
+          </a:prstGeom>
+        </p:spPr>
+      </p:pic>
     </p:spTree>
     <p:extLst>
       <p:ext uri="{BB962C8B-B14F-4D97-AF65-F5344CB8AC3E}">
-        <p14:creationId xmlns:p14="http://schemas.microsoft.com/office/powerpoint/2010/main" val="182169773"/>
+        <p14:creationId xmlns:p14="http://schemas.microsoft.com/office/powerpoint/2010/main" val="2964780049"/>
+      </p:ext>
+    </p:extLst>
+  </p:cSld>
+  <p:clrMapOvr>
+    <a:masterClrMapping/>
+  </p:clrMapOvr>
+</p:sld>
+</file>
+
+<file path=ppt/slides/slide5.xml><?xml version="1.0" encoding="utf-8"?>
+<p:sld xmlns:a="http://schemas.openxmlformats.org/drawingml/2006/main" xmlns:r="http://schemas.openxmlformats.org/officeDocument/2006/relationships" xmlns:p="http://schemas.openxmlformats.org/presentationml/2006/main">
+  <p:cSld>
+    <p:spTree>
+      <p:nvGrpSpPr>
+        <p:cNvPr id="1" name=""/>
+        <p:cNvGrpSpPr/>
+        <p:nvPr/>
+      </p:nvGrpSpPr>
+      <p:grpSpPr>
+        <a:xfrm>
+          <a:off x="0" y="0"/>
+          <a:ext cx="0" cy="0"/>
+          <a:chOff x="0" y="0"/>
+          <a:chExt cx="0" cy="0"/>
+        </a:xfrm>
+      </p:grpSpPr>
+      <p:sp>
+        <p:nvSpPr>
+          <p:cNvPr id="2" name="Title 1"/>
+          <p:cNvSpPr>
+            <a:spLocks noGrp="1"/>
+          </p:cNvSpPr>
+          <p:nvPr>
+            <p:ph type="title"/>
+          </p:nvPr>
+        </p:nvSpPr>
+        <p:spPr/>
+        <p:txBody>
+          <a:bodyPr/>
+          <a:lstStyle/>
+          <a:p>
+            <a:r>
+              <a:rPr lang="nl-NL" smtClean="0"/>
+              <a:t>New </a:t>
+            </a:r>
+            <a:r>
+              <a:rPr lang="nl-NL" smtClean="0"/>
+              <a:t>databinding syntax </a:t>
+            </a:r>
+            <a:r>
+              <a:rPr lang="nl-NL" smtClean="0"/>
+              <a:t>since JET 4.0</a:t>
+            </a:r>
+            <a:endParaRPr lang="nl-NL"/>
+          </a:p>
+        </p:txBody>
+      </p:sp>
+      <p:sp>
+        <p:nvSpPr>
+          <p:cNvPr id="3" name="Content Placeholder 2"/>
+          <p:cNvSpPr>
+            <a:spLocks noGrp="1"/>
+          </p:cNvSpPr>
+          <p:nvPr>
+            <p:ph idx="1"/>
+          </p:nvPr>
+        </p:nvSpPr>
+        <p:spPr/>
+        <p:txBody>
+          <a:bodyPr/>
+          <a:lstStyle/>
+          <a:p>
+            <a:r>
+              <a:rPr lang="nl-NL" smtClean="0"/>
+              <a:t>Oracle takes a small step towards Angular</a:t>
+            </a:r>
+          </a:p>
+          <a:p>
+            <a:endParaRPr lang="nl-NL" smtClean="0"/>
+          </a:p>
+          <a:p>
+            <a:pPr marL="0" indent="0">
+              <a:buNone/>
+            </a:pPr>
+            <a:r>
+              <a:rPr lang="nl-NL"/>
+              <a:t>&lt;span data-bind="text: id"&gt;&lt;/span&gt;</a:t>
+            </a:r>
+          </a:p>
+          <a:p>
+            <a:pPr marL="0" indent="0">
+              <a:buNone/>
+            </a:pPr>
+            <a:r>
+              <a:rPr lang="nl-NL"/>
+              <a:t>&lt;span data-bind="text: name"&gt;&lt;/span</a:t>
+            </a:r>
+            <a:r>
+              <a:rPr lang="nl-NL" smtClean="0"/>
+              <a:t>&gt;</a:t>
+            </a:r>
+          </a:p>
+          <a:p>
+            <a:pPr marL="0" indent="0">
+              <a:buNone/>
+            </a:pPr>
+            <a:endParaRPr lang="nl-NL"/>
+          </a:p>
+          <a:p>
+            <a:pPr marL="0" indent="0">
+              <a:buNone/>
+            </a:pPr>
+            <a:r>
+              <a:rPr lang="nl-NL" smtClean="0"/>
+              <a:t>Becomes: </a:t>
+            </a:r>
+          </a:p>
+          <a:p>
+            <a:pPr marL="0" indent="0">
+              <a:buNone/>
+            </a:pPr>
+            <a:r>
+              <a:rPr lang="nl-NL" smtClean="0"/>
+              <a:t>&lt;</a:t>
+            </a:r>
+            <a:r>
+              <a:rPr lang="nl-NL"/>
+              <a:t>p&gt;{{id}} {{name}}&lt;/p</a:t>
+            </a:r>
+            <a:r>
+              <a:rPr lang="nl-NL" smtClean="0"/>
+              <a:t>&gt;</a:t>
+            </a:r>
+          </a:p>
+          <a:p>
+            <a:pPr marL="0" indent="0">
+              <a:buNone/>
+            </a:pPr>
+            <a:endParaRPr lang="nl-NL"/>
+          </a:p>
+          <a:p>
+            <a:r>
+              <a:rPr lang="nl-NL" smtClean="0"/>
+              <a:t>This is two-way databinding (write changes back to observable)</a:t>
+            </a:r>
+          </a:p>
+          <a:p>
+            <a:r>
+              <a:rPr lang="nl-NL" smtClean="0"/>
+              <a:t>One-way binding (no write-back) goes like this:</a:t>
+            </a:r>
+          </a:p>
+          <a:p>
+            <a:endParaRPr lang="nl-NL" smtClean="0"/>
+          </a:p>
+          <a:p>
+            <a:pPr marL="0" indent="0">
+              <a:buNone/>
+            </a:pPr>
+            <a:r>
+              <a:rPr lang="nl-NL"/>
+              <a:t>&lt;</a:t>
+            </a:r>
+            <a:r>
+              <a:rPr lang="nl-NL" smtClean="0"/>
+              <a:t>p&gt;[[id]] [[name]]&lt;/</a:t>
+            </a:r>
+            <a:r>
+              <a:rPr lang="nl-NL"/>
+              <a:t>p&gt;</a:t>
+            </a:r>
+          </a:p>
+          <a:p>
+            <a:endParaRPr lang="nl-NL" smtClean="0"/>
+          </a:p>
+          <a:p>
+            <a:endParaRPr lang="nl-NL"/>
+          </a:p>
+          <a:p>
+            <a:pPr marL="0" indent="0">
+              <a:buNone/>
+            </a:pPr>
+            <a:endParaRPr lang="nl-NL"/>
+          </a:p>
+          <a:p>
+            <a:pPr marL="0" indent="0">
+              <a:buNone/>
+            </a:pPr>
+            <a:endParaRPr lang="nl-NL"/>
+          </a:p>
+        </p:txBody>
+      </p:sp>
+      <p:sp>
+        <p:nvSpPr>
+          <p:cNvPr id="4" name="Footer Placeholder 3"/>
+          <p:cNvSpPr>
+            <a:spLocks noGrp="1"/>
+          </p:cNvSpPr>
+          <p:nvPr>
+            <p:ph type="ftr" sz="quarter" idx="11"/>
+          </p:nvPr>
+        </p:nvSpPr>
+        <p:spPr/>
+        <p:txBody>
+          <a:bodyPr/>
+          <a:lstStyle/>
+          <a:p>
+            <a:r>
+              <a:rPr lang="nl-NL" smtClean="0"/>
+              <a:t>Demonstration, sprint 3</a:t>
+            </a:r>
+            <a:endParaRPr lang="nl-NL" dirty="0"/>
+          </a:p>
+        </p:txBody>
+      </p:sp>
+      <p:sp>
+        <p:nvSpPr>
+          <p:cNvPr id="5" name="Slide Number Placeholder 4"/>
+          <p:cNvSpPr>
+            <a:spLocks noGrp="1"/>
+          </p:cNvSpPr>
+          <p:nvPr>
+            <p:ph type="sldNum" sz="quarter" idx="12"/>
+          </p:nvPr>
+        </p:nvSpPr>
+        <p:spPr/>
+        <p:txBody>
+          <a:bodyPr/>
+          <a:lstStyle/>
+          <a:p>
+            <a:fld id="{14F1411D-0280-154F-AEAC-4C20B7AA46B2}" type="slidenum">
+              <a:rPr lang="nl-NL" smtClean="0"/>
+              <a:t>5</a:t>
+            </a:fld>
+            <a:endParaRPr lang="nl-NL"/>
+          </a:p>
+        </p:txBody>
+      </p:sp>
+    </p:spTree>
+    <p:extLst>
+      <p:ext uri="{BB962C8B-B14F-4D97-AF65-F5344CB8AC3E}">
+        <p14:creationId xmlns:p14="http://schemas.microsoft.com/office/powerpoint/2010/main" val="2261056789"/>
       </p:ext>
     </p:extLst>
   </p:cSld>

</xml_diff>